<commit_message>
REWORK complet du soft RS485 Maître/Esclave. Partie protocole OK. A finaliser...
</commit_message>
<xml_diff>
--- a/jarduino2/jard_485_slave/fabrication/modele_2024/howto.pptx
+++ b/jarduino2/jard_485_slave/fabrication/modele_2024/howto.pptx
@@ -7,12 +7,13 @@
   <p:sldIdLst>
     <p:sldId id="261" r:id="rId2"/>
     <p:sldId id="257" r:id="rId3"/>
-    <p:sldId id="258" r:id="rId4"/>
+    <p:sldId id="262" r:id="rId4"/>
     <p:sldId id="259" r:id="rId5"/>
-    <p:sldId id="260" r:id="rId6"/>
+    <p:sldId id="258" r:id="rId6"/>
+    <p:sldId id="260" r:id="rId7"/>
   </p:sldIdLst>
   <p:sldSz cx="12192000" cy="6858000"/>
-  <p:notesSz cx="6858000" cy="9144000"/>
+  <p:notesSz cx="6797675" cy="9926638"/>
   <p:defaultTextStyle>
     <a:defPPr>
       <a:defRPr lang="fr-FR"/>
@@ -108,6 +109,11 @@
       </a:defRPr>
     </a:lvl9pPr>
   </p:defaultTextStyle>
+  <p:extLst>
+    <p:ext uri="{EFAFB233-063F-42B5-8137-9DF3F51BA10A}">
+      <p15:sldGuideLst xmlns:p15="http://schemas.microsoft.com/office/powerpoint/2012/main"/>
+    </p:ext>
+  </p:extLst>
 </p:presentation>
 </file>
 
@@ -258,7 +264,7 @@
           <a:p>
             <a:fld id="{7F33ED73-A2C0-4FF3-844A-2E17AC728519}" type="datetimeFigureOut">
               <a:rPr lang="fr-FR" smtClean="0"/>
-              <a:t>24/03/2024</a:t>
+              <a:t>01/04/2024</a:t>
             </a:fld>
             <a:endParaRPr lang="fr-FR"/>
           </a:p>
@@ -456,7 +462,7 @@
           <a:p>
             <a:fld id="{7F33ED73-A2C0-4FF3-844A-2E17AC728519}" type="datetimeFigureOut">
               <a:rPr lang="fr-FR" smtClean="0"/>
-              <a:t>24/03/2024</a:t>
+              <a:t>01/04/2024</a:t>
             </a:fld>
             <a:endParaRPr lang="fr-FR"/>
           </a:p>
@@ -664,7 +670,7 @@
           <a:p>
             <a:fld id="{7F33ED73-A2C0-4FF3-844A-2E17AC728519}" type="datetimeFigureOut">
               <a:rPr lang="fr-FR" smtClean="0"/>
-              <a:t>24/03/2024</a:t>
+              <a:t>01/04/2024</a:t>
             </a:fld>
             <a:endParaRPr lang="fr-FR"/>
           </a:p>
@@ -862,7 +868,7 @@
           <a:p>
             <a:fld id="{7F33ED73-A2C0-4FF3-844A-2E17AC728519}" type="datetimeFigureOut">
               <a:rPr lang="fr-FR" smtClean="0"/>
-              <a:t>24/03/2024</a:t>
+              <a:t>01/04/2024</a:t>
             </a:fld>
             <a:endParaRPr lang="fr-FR"/>
           </a:p>
@@ -1137,7 +1143,7 @@
           <a:p>
             <a:fld id="{7F33ED73-A2C0-4FF3-844A-2E17AC728519}" type="datetimeFigureOut">
               <a:rPr lang="fr-FR" smtClean="0"/>
-              <a:t>24/03/2024</a:t>
+              <a:t>01/04/2024</a:t>
             </a:fld>
             <a:endParaRPr lang="fr-FR"/>
           </a:p>
@@ -1402,7 +1408,7 @@
           <a:p>
             <a:fld id="{7F33ED73-A2C0-4FF3-844A-2E17AC728519}" type="datetimeFigureOut">
               <a:rPr lang="fr-FR" smtClean="0"/>
-              <a:t>24/03/2024</a:t>
+              <a:t>01/04/2024</a:t>
             </a:fld>
             <a:endParaRPr lang="fr-FR"/>
           </a:p>
@@ -1814,7 +1820,7 @@
           <a:p>
             <a:fld id="{7F33ED73-A2C0-4FF3-844A-2E17AC728519}" type="datetimeFigureOut">
               <a:rPr lang="fr-FR" smtClean="0"/>
-              <a:t>24/03/2024</a:t>
+              <a:t>01/04/2024</a:t>
             </a:fld>
             <a:endParaRPr lang="fr-FR"/>
           </a:p>
@@ -1955,7 +1961,7 @@
           <a:p>
             <a:fld id="{7F33ED73-A2C0-4FF3-844A-2E17AC728519}" type="datetimeFigureOut">
               <a:rPr lang="fr-FR" smtClean="0"/>
-              <a:t>24/03/2024</a:t>
+              <a:t>01/04/2024</a:t>
             </a:fld>
             <a:endParaRPr lang="fr-FR"/>
           </a:p>
@@ -2068,7 +2074,7 @@
           <a:p>
             <a:fld id="{7F33ED73-A2C0-4FF3-844A-2E17AC728519}" type="datetimeFigureOut">
               <a:rPr lang="fr-FR" smtClean="0"/>
-              <a:t>24/03/2024</a:t>
+              <a:t>01/04/2024</a:t>
             </a:fld>
             <a:endParaRPr lang="fr-FR"/>
           </a:p>
@@ -2379,7 +2385,7 @@
           <a:p>
             <a:fld id="{7F33ED73-A2C0-4FF3-844A-2E17AC728519}" type="datetimeFigureOut">
               <a:rPr lang="fr-FR" smtClean="0"/>
-              <a:t>24/03/2024</a:t>
+              <a:t>01/04/2024</a:t>
             </a:fld>
             <a:endParaRPr lang="fr-FR"/>
           </a:p>
@@ -2667,7 +2673,7 @@
           <a:p>
             <a:fld id="{7F33ED73-A2C0-4FF3-844A-2E17AC728519}" type="datetimeFigureOut">
               <a:rPr lang="fr-FR" smtClean="0"/>
-              <a:t>24/03/2024</a:t>
+              <a:t>01/04/2024</a:t>
             </a:fld>
             <a:endParaRPr lang="fr-FR"/>
           </a:p>
@@ -2908,7 +2914,7 @@
           <a:p>
             <a:fld id="{7F33ED73-A2C0-4FF3-844A-2E17AC728519}" type="datetimeFigureOut">
               <a:rPr lang="fr-FR" smtClean="0"/>
-              <a:t>24/03/2024</a:t>
+              <a:t>01/04/2024</a:t>
             </a:fld>
             <a:endParaRPr lang="fr-FR"/>
           </a:p>
@@ -3891,6 +3897,116 @@
           </a:prstGeom>
         </p:spPr>
       </p:pic>
+      <p:sp>
+        <p:nvSpPr>
+          <p:cNvPr id="2" name="ZoneTexte 1">
+            <a:extLst>
+              <a:ext uri="{FF2B5EF4-FFF2-40B4-BE49-F238E27FC236}">
+                <a16:creationId xmlns:a16="http://schemas.microsoft.com/office/drawing/2014/main" id="{B6EFB674-017A-8F6E-A017-ACB04905A109}"/>
+              </a:ext>
+            </a:extLst>
+          </p:cNvPr>
+          <p:cNvSpPr txBox="1"/>
+          <p:nvPr/>
+        </p:nvSpPr>
+        <p:spPr>
+          <a:xfrm>
+            <a:off x="5111991" y="5305326"/>
+            <a:ext cx="1952329" cy="461665"/>
+          </a:xfrm>
+          <a:prstGeom prst="rect">
+            <a:avLst/>
+          </a:prstGeom>
+          <a:noFill/>
+        </p:spPr>
+        <p:txBody>
+          <a:bodyPr wrap="none" rtlCol="0">
+            <a:spAutoFit/>
+          </a:bodyPr>
+          <a:lstStyle/>
+          <a:p>
+            <a:r>
+              <a:rPr lang="fr-FR" sz="1200" dirty="0"/>
+              <a:t>Trou pour tuyau EV: 12 mm</a:t>
+            </a:r>
+          </a:p>
+          <a:p>
+            <a:r>
+              <a:rPr lang="fr-FR" sz="1200" dirty="0"/>
+              <a:t>Trou pour jauge: 10 mm</a:t>
+            </a:r>
+          </a:p>
+        </p:txBody>
+      </p:sp>
+      <p:sp>
+        <p:nvSpPr>
+          <p:cNvPr id="3" name="ZoneTexte 2">
+            <a:extLst>
+              <a:ext uri="{FF2B5EF4-FFF2-40B4-BE49-F238E27FC236}">
+                <a16:creationId xmlns:a16="http://schemas.microsoft.com/office/drawing/2014/main" id="{ACFE4670-50DF-A227-90E7-22FBCD2021B4}"/>
+              </a:ext>
+            </a:extLst>
+          </p:cNvPr>
+          <p:cNvSpPr txBox="1"/>
+          <p:nvPr/>
+        </p:nvSpPr>
+        <p:spPr>
+          <a:xfrm>
+            <a:off x="965200" y="832919"/>
+            <a:ext cx="2935355" cy="830997"/>
+          </a:xfrm>
+          <a:prstGeom prst="rect">
+            <a:avLst/>
+          </a:prstGeom>
+          <a:noFill/>
+        </p:spPr>
+        <p:txBody>
+          <a:bodyPr wrap="none" rtlCol="0">
+            <a:spAutoFit/>
+          </a:bodyPr>
+          <a:lstStyle/>
+          <a:p>
+            <a:pPr marL="171450" indent="-171450">
+              <a:buFont typeface="Arial" panose="020B0604020202020204" pitchFamily="34" charset="0"/>
+              <a:buChar char="•"/>
+            </a:pPr>
+            <a:r>
+              <a:rPr lang="fr-FR" sz="1200" dirty="0"/>
+              <a:t>Déterminer le centre (avec un compas)</a:t>
+            </a:r>
+          </a:p>
+          <a:p>
+            <a:pPr marL="171450" indent="-171450">
+              <a:buFont typeface="Arial" panose="020B0604020202020204" pitchFamily="34" charset="0"/>
+              <a:buChar char="•"/>
+            </a:pPr>
+            <a:r>
+              <a:rPr lang="fr-FR" sz="1200" dirty="0"/>
+              <a:t>Tracer un rayon (les 2 trous y seront)</a:t>
+            </a:r>
+          </a:p>
+          <a:p>
+            <a:pPr marL="171450" indent="-171450">
+              <a:buFont typeface="Arial" panose="020B0604020202020204" pitchFamily="34" charset="0"/>
+              <a:buChar char="•"/>
+            </a:pPr>
+            <a:r>
+              <a:rPr lang="fr-FR" sz="1200" dirty="0"/>
+              <a:t>Percer 12mm à 2,6cm du bord</a:t>
+            </a:r>
+          </a:p>
+          <a:p>
+            <a:pPr marL="171450" indent="-171450">
+              <a:buFont typeface="Arial" panose="020B0604020202020204" pitchFamily="34" charset="0"/>
+              <a:buChar char="•"/>
+            </a:pPr>
+            <a:r>
+              <a:rPr lang="fr-FR" sz="1200" dirty="0"/>
+              <a:t>Percer 10mm à 6cm du bord</a:t>
+            </a:r>
+          </a:p>
+        </p:txBody>
+      </p:sp>
     </p:spTree>
     <p:extLst>
       <p:ext uri="{BB962C8B-B14F-4D97-AF65-F5344CB8AC3E}">
@@ -3907,6 +4023,14 @@
 <file path=ppt/slides/slide3.xml><?xml version="1.0" encoding="utf-8"?>
 <p:sld xmlns:a="http://schemas.openxmlformats.org/drawingml/2006/main" xmlns:r="http://schemas.openxmlformats.org/officeDocument/2006/relationships" xmlns:p="http://schemas.openxmlformats.org/presentationml/2006/main">
   <p:cSld>
+    <p:bg>
+      <p:bgPr>
+        <a:solidFill>
+          <a:schemeClr val="bg1"/>
+        </a:solidFill>
+        <a:effectLst/>
+      </p:bgPr>
+    </p:bg>
     <p:spTree>
       <p:nvGrpSpPr>
         <p:cNvPr id="1" name=""/>
@@ -3921,12 +4045,496 @@
           <a:chExt cx="0" cy="0"/>
         </a:xfrm>
       </p:grpSpPr>
+      <p:sp>
+        <p:nvSpPr>
+          <p:cNvPr id="11" name="Rectangle 10">
+            <a:extLst>
+              <a:ext uri="{FF2B5EF4-FFF2-40B4-BE49-F238E27FC236}">
+                <a16:creationId xmlns:a16="http://schemas.microsoft.com/office/drawing/2014/main" id="{F3060C83-F051-4F0E-ABAD-AA0DFC48B218}"/>
+              </a:ext>
+              <a:ext uri="{C183D7F6-B498-43B3-948B-1728B52AA6E4}">
+                <adec:decorative xmlns:adec="http://schemas.microsoft.com/office/drawing/2017/decorative" val="1"/>
+              </a:ext>
+            </a:extLst>
+          </p:cNvPr>
+          <p:cNvSpPr>
+            <a:spLocks noGrp="1" noRot="1" noChangeAspect="1" noMove="1" noResize="1" noEditPoints="1" noAdjustHandles="1" noChangeArrowheads="1" noChangeShapeType="1" noTextEdit="1"/>
+          </p:cNvSpPr>
+          <p:nvPr>
+            <p:extLst>
+              <p:ext uri="{386F3935-93C4-4BCD-93E2-E3B085C9AB24}">
+                <p16:designElem xmlns:p16="http://schemas.microsoft.com/office/powerpoint/2015/main" val="1"/>
+              </p:ext>
+            </p:extLst>
+          </p:nvPr>
+        </p:nvSpPr>
+        <p:spPr>
+          <a:xfrm>
+            <a:off x="0" y="0"/>
+            <a:ext cx="12192000" cy="6858000"/>
+          </a:xfrm>
+          <a:prstGeom prst="rect">
+            <a:avLst/>
+          </a:prstGeom>
+          <a:solidFill>
+            <a:schemeClr val="bg1"/>
+          </a:solidFill>
+          <a:ln>
+            <a:noFill/>
+          </a:ln>
+        </p:spPr>
+        <p:style>
+          <a:lnRef idx="2">
+            <a:schemeClr val="accent1">
+              <a:shade val="50000"/>
+            </a:schemeClr>
+          </a:lnRef>
+          <a:fillRef idx="1">
+            <a:schemeClr val="accent1"/>
+          </a:fillRef>
+          <a:effectRef idx="0">
+            <a:schemeClr val="accent1"/>
+          </a:effectRef>
+          <a:fontRef idx="minor">
+            <a:schemeClr val="lt1"/>
+          </a:fontRef>
+        </p:style>
+        <p:txBody>
+          <a:bodyPr rtlCol="0" anchor="ctr"/>
+          <a:lstStyle/>
+          <a:p>
+            <a:pPr algn="ctr"/>
+            <a:endParaRPr lang="en-US" dirty="0"/>
+          </a:p>
+        </p:txBody>
+      </p:sp>
+      <p:sp>
+        <p:nvSpPr>
+          <p:cNvPr id="13" name="Freeform: Shape 12">
+            <a:extLst>
+              <a:ext uri="{FF2B5EF4-FFF2-40B4-BE49-F238E27FC236}">
+                <a16:creationId xmlns:a16="http://schemas.microsoft.com/office/drawing/2014/main" id="{83C98ABE-055B-441F-B07E-44F97F083C39}"/>
+              </a:ext>
+              <a:ext uri="{C183D7F6-B498-43B3-948B-1728B52AA6E4}">
+                <adec:decorative xmlns:adec="http://schemas.microsoft.com/office/drawing/2017/decorative" val="1"/>
+              </a:ext>
+            </a:extLst>
+          </p:cNvPr>
+          <p:cNvSpPr>
+            <a:spLocks noGrp="1" noRot="1" noChangeAspect="1" noMove="1" noResize="1" noEditPoints="1" noAdjustHandles="1" noChangeArrowheads="1" noChangeShapeType="1" noTextEdit="1"/>
+          </p:cNvSpPr>
+          <p:nvPr>
+            <p:extLst>
+              <p:ext uri="{386F3935-93C4-4BCD-93E2-E3B085C9AB24}">
+                <p16:designElem xmlns:p16="http://schemas.microsoft.com/office/powerpoint/2015/main" val="1"/>
+              </p:ext>
+            </p:extLst>
+          </p:nvPr>
+        </p:nvSpPr>
+        <p:spPr>
+          <a:xfrm rot="18900000" flipH="1">
+            <a:off x="-376156" y="-253670"/>
+            <a:ext cx="1827638" cy="1376989"/>
+          </a:xfrm>
+          <a:custGeom>
+            <a:avLst/>
+            <a:gdLst>
+              <a:gd name="connsiteX0" fmla="*/ 0 w 1827638"/>
+              <a:gd name="connsiteY0" fmla="*/ 987379 h 1376989"/>
+              <a:gd name="connsiteX1" fmla="*/ 987379 w 1827638"/>
+              <a:gd name="connsiteY1" fmla="*/ 0 h 1376989"/>
+              <a:gd name="connsiteX2" fmla="*/ 1827638 w 1827638"/>
+              <a:gd name="connsiteY2" fmla="*/ 840260 h 1376989"/>
+              <a:gd name="connsiteX3" fmla="*/ 1827638 w 1827638"/>
+              <a:gd name="connsiteY3" fmla="*/ 1376989 h 1376989"/>
+              <a:gd name="connsiteX4" fmla="*/ 0 w 1827638"/>
+              <a:gd name="connsiteY4" fmla="*/ 1376989 h 1376989"/>
+            </a:gdLst>
+            <a:ahLst/>
+            <a:cxnLst>
+              <a:cxn ang="0">
+                <a:pos x="connsiteX0" y="connsiteY0"/>
+              </a:cxn>
+              <a:cxn ang="0">
+                <a:pos x="connsiteX1" y="connsiteY1"/>
+              </a:cxn>
+              <a:cxn ang="0">
+                <a:pos x="connsiteX2" y="connsiteY2"/>
+              </a:cxn>
+              <a:cxn ang="0">
+                <a:pos x="connsiteX3" y="connsiteY3"/>
+              </a:cxn>
+              <a:cxn ang="0">
+                <a:pos x="connsiteX4" y="connsiteY4"/>
+              </a:cxn>
+            </a:cxnLst>
+            <a:rect l="l" t="t" r="r" b="b"/>
+            <a:pathLst>
+              <a:path w="1827638" h="1376989">
+                <a:moveTo>
+                  <a:pt x="0" y="987379"/>
+                </a:moveTo>
+                <a:lnTo>
+                  <a:pt x="987379" y="0"/>
+                </a:lnTo>
+                <a:lnTo>
+                  <a:pt x="1827638" y="840260"/>
+                </a:lnTo>
+                <a:lnTo>
+                  <a:pt x="1827638" y="1376989"/>
+                </a:lnTo>
+                <a:lnTo>
+                  <a:pt x="0" y="1376989"/>
+                </a:lnTo>
+                <a:close/>
+              </a:path>
+            </a:pathLst>
+          </a:custGeom>
+          <a:solidFill>
+            <a:schemeClr val="accent1">
+              <a:alpha val="30000"/>
+            </a:schemeClr>
+          </a:solidFill>
+          <a:ln>
+            <a:noFill/>
+          </a:ln>
+        </p:spPr>
+        <p:style>
+          <a:lnRef idx="2">
+            <a:schemeClr val="accent1">
+              <a:shade val="50000"/>
+            </a:schemeClr>
+          </a:lnRef>
+          <a:fillRef idx="1">
+            <a:schemeClr val="accent1"/>
+          </a:fillRef>
+          <a:effectRef idx="0">
+            <a:schemeClr val="accent1"/>
+          </a:effectRef>
+          <a:fontRef idx="minor">
+            <a:schemeClr val="lt1"/>
+          </a:fontRef>
+        </p:style>
+        <p:txBody>
+          <a:bodyPr rtlCol="0" anchor="ctr"/>
+          <a:lstStyle/>
+          <a:p>
+            <a:pPr algn="ctr"/>
+            <a:endParaRPr lang="en-US" dirty="0"/>
+          </a:p>
+        </p:txBody>
+      </p:sp>
+      <p:sp>
+        <p:nvSpPr>
+          <p:cNvPr id="15" name="Rectangle 14">
+            <a:extLst>
+              <a:ext uri="{FF2B5EF4-FFF2-40B4-BE49-F238E27FC236}">
+                <a16:creationId xmlns:a16="http://schemas.microsoft.com/office/drawing/2014/main" id="{29FDB030-9B49-4CED-8CCD-4D99382388AC}"/>
+              </a:ext>
+              <a:ext uri="{C183D7F6-B498-43B3-948B-1728B52AA6E4}">
+                <adec:decorative xmlns:adec="http://schemas.microsoft.com/office/drawing/2017/decorative" val="1"/>
+              </a:ext>
+            </a:extLst>
+          </p:cNvPr>
+          <p:cNvSpPr>
+            <a:spLocks noGrp="1" noRot="1" noChangeAspect="1" noMove="1" noResize="1" noEditPoints="1" noAdjustHandles="1" noChangeArrowheads="1" noChangeShapeType="1" noTextEdit="1"/>
+          </p:cNvSpPr>
+          <p:nvPr>
+            <p:extLst>
+              <p:ext uri="{386F3935-93C4-4BCD-93E2-E3B085C9AB24}">
+                <p16:designElem xmlns:p16="http://schemas.microsoft.com/office/powerpoint/2015/main" val="1"/>
+              </p:ext>
+            </p:extLst>
+          </p:nvPr>
+        </p:nvSpPr>
+        <p:spPr>
+          <a:xfrm rot="18900000" flipH="1">
+            <a:off x="891641" y="422146"/>
+            <a:ext cx="645368" cy="645368"/>
+          </a:xfrm>
+          <a:prstGeom prst="rect">
+            <a:avLst/>
+          </a:prstGeom>
+          <a:solidFill>
+            <a:schemeClr val="accent1">
+              <a:alpha val="30000"/>
+            </a:schemeClr>
+          </a:solidFill>
+          <a:ln>
+            <a:noFill/>
+          </a:ln>
+        </p:spPr>
+        <p:style>
+          <a:lnRef idx="2">
+            <a:schemeClr val="accent1">
+              <a:shade val="50000"/>
+            </a:schemeClr>
+          </a:lnRef>
+          <a:fillRef idx="1">
+            <a:schemeClr val="accent1"/>
+          </a:fillRef>
+          <a:effectRef idx="0">
+            <a:schemeClr val="accent1"/>
+          </a:effectRef>
+          <a:fontRef idx="minor">
+            <a:schemeClr val="lt1"/>
+          </a:fontRef>
+        </p:style>
+        <p:txBody>
+          <a:bodyPr rtlCol="0" anchor="ctr"/>
+          <a:lstStyle/>
+          <a:p>
+            <a:pPr algn="ctr"/>
+            <a:endParaRPr lang="en-US"/>
+          </a:p>
+        </p:txBody>
+      </p:sp>
+      <p:sp>
+        <p:nvSpPr>
+          <p:cNvPr id="17" name="Rectangle 16">
+            <a:extLst>
+              <a:ext uri="{FF2B5EF4-FFF2-40B4-BE49-F238E27FC236}">
+                <a16:creationId xmlns:a16="http://schemas.microsoft.com/office/drawing/2014/main" id="{3783CA14-24A1-485C-8B30-D6A5D87987AD}"/>
+              </a:ext>
+              <a:ext uri="{C183D7F6-B498-43B3-948B-1728B52AA6E4}">
+                <adec:decorative xmlns:adec="http://schemas.microsoft.com/office/drawing/2017/decorative" val="1"/>
+              </a:ext>
+            </a:extLst>
+          </p:cNvPr>
+          <p:cNvSpPr>
+            <a:spLocks noGrp="1" noRot="1" noChangeAspect="1" noMove="1" noResize="1" noEditPoints="1" noAdjustHandles="1" noChangeArrowheads="1" noChangeShapeType="1" noTextEdit="1"/>
+          </p:cNvSpPr>
+          <p:nvPr>
+            <p:extLst>
+              <p:ext uri="{386F3935-93C4-4BCD-93E2-E3B085C9AB24}">
+                <p16:designElem xmlns:p16="http://schemas.microsoft.com/office/powerpoint/2015/main" val="1"/>
+              </p:ext>
+            </p:extLst>
+          </p:nvPr>
+        </p:nvSpPr>
+        <p:spPr>
+          <a:xfrm rot="18900000" flipH="1">
+            <a:off x="10043482" y="655140"/>
+            <a:ext cx="687472" cy="687472"/>
+          </a:xfrm>
+          <a:prstGeom prst="rect">
+            <a:avLst/>
+          </a:prstGeom>
+          <a:solidFill>
+            <a:schemeClr val="accent4">
+              <a:alpha val="30000"/>
+            </a:schemeClr>
+          </a:solidFill>
+          <a:ln>
+            <a:noFill/>
+          </a:ln>
+        </p:spPr>
+        <p:style>
+          <a:lnRef idx="2">
+            <a:schemeClr val="accent1">
+              <a:shade val="50000"/>
+            </a:schemeClr>
+          </a:lnRef>
+          <a:fillRef idx="1">
+            <a:schemeClr val="accent1"/>
+          </a:fillRef>
+          <a:effectRef idx="0">
+            <a:schemeClr val="accent1"/>
+          </a:effectRef>
+          <a:fontRef idx="minor">
+            <a:schemeClr val="lt1"/>
+          </a:fontRef>
+        </p:style>
+        <p:txBody>
+          <a:bodyPr rtlCol="0" anchor="ctr"/>
+          <a:lstStyle/>
+          <a:p>
+            <a:pPr algn="ctr"/>
+            <a:endParaRPr lang="en-US"/>
+          </a:p>
+        </p:txBody>
+      </p:sp>
+      <p:sp>
+        <p:nvSpPr>
+          <p:cNvPr id="19" name="Freeform: Shape 18">
+            <a:extLst>
+              <a:ext uri="{FF2B5EF4-FFF2-40B4-BE49-F238E27FC236}">
+                <a16:creationId xmlns:a16="http://schemas.microsoft.com/office/drawing/2014/main" id="{9A97C86A-04D6-40F7-AE84-31AB43E6A846}"/>
+              </a:ext>
+              <a:ext uri="{C183D7F6-B498-43B3-948B-1728B52AA6E4}">
+                <adec:decorative xmlns:adec="http://schemas.microsoft.com/office/drawing/2017/decorative" val="1"/>
+              </a:ext>
+            </a:extLst>
+          </p:cNvPr>
+          <p:cNvSpPr>
+            <a:spLocks noGrp="1" noRot="1" noChangeAspect="1" noMove="1" noResize="1" noEditPoints="1" noAdjustHandles="1" noChangeArrowheads="1" noChangeShapeType="1" noTextEdit="1"/>
+          </p:cNvSpPr>
+          <p:nvPr>
+            <p:extLst>
+              <p:ext uri="{386F3935-93C4-4BCD-93E2-E3B085C9AB24}">
+                <p16:designElem xmlns:p16="http://schemas.microsoft.com/office/powerpoint/2015/main" val="1"/>
+              </p:ext>
+            </p:extLst>
+          </p:nvPr>
+        </p:nvSpPr>
+        <p:spPr>
+          <a:xfrm rot="10800000" flipH="1">
+            <a:off x="9356643" y="0"/>
+            <a:ext cx="2835357" cy="1480837"/>
+          </a:xfrm>
+          <a:custGeom>
+            <a:avLst/>
+            <a:gdLst>
+              <a:gd name="connsiteX0" fmla="*/ 2835357 w 2835357"/>
+              <a:gd name="connsiteY0" fmla="*/ 1480837 h 1480837"/>
+              <a:gd name="connsiteX1" fmla="*/ 0 w 2835357"/>
+              <a:gd name="connsiteY1" fmla="*/ 1480837 h 1480837"/>
+              <a:gd name="connsiteX2" fmla="*/ 1552727 w 2835357"/>
+              <a:gd name="connsiteY2" fmla="*/ 0 h 1480837"/>
+              <a:gd name="connsiteX3" fmla="*/ 2835357 w 2835357"/>
+              <a:gd name="connsiteY3" fmla="*/ 1223245 h 1480837"/>
+            </a:gdLst>
+            <a:ahLst/>
+            <a:cxnLst>
+              <a:cxn ang="0">
+                <a:pos x="connsiteX0" y="connsiteY0"/>
+              </a:cxn>
+              <a:cxn ang="0">
+                <a:pos x="connsiteX1" y="connsiteY1"/>
+              </a:cxn>
+              <a:cxn ang="0">
+                <a:pos x="connsiteX2" y="connsiteY2"/>
+              </a:cxn>
+              <a:cxn ang="0">
+                <a:pos x="connsiteX3" y="connsiteY3"/>
+              </a:cxn>
+            </a:cxnLst>
+            <a:rect l="l" t="t" r="r" b="b"/>
+            <a:pathLst>
+              <a:path w="2835357" h="1480837">
+                <a:moveTo>
+                  <a:pt x="2835357" y="1480837"/>
+                </a:moveTo>
+                <a:lnTo>
+                  <a:pt x="0" y="1480837"/>
+                </a:lnTo>
+                <a:lnTo>
+                  <a:pt x="1552727" y="0"/>
+                </a:lnTo>
+                <a:lnTo>
+                  <a:pt x="2835357" y="1223245"/>
+                </a:lnTo>
+                <a:close/>
+              </a:path>
+            </a:pathLst>
+          </a:custGeom>
+          <a:solidFill>
+            <a:schemeClr val="accent4">
+              <a:alpha val="30000"/>
+            </a:schemeClr>
+          </a:solidFill>
+          <a:ln>
+            <a:noFill/>
+          </a:ln>
+        </p:spPr>
+        <p:style>
+          <a:lnRef idx="2">
+            <a:schemeClr val="accent1">
+              <a:shade val="50000"/>
+            </a:schemeClr>
+          </a:lnRef>
+          <a:fillRef idx="1">
+            <a:schemeClr val="accent1"/>
+          </a:fillRef>
+          <a:effectRef idx="0">
+            <a:schemeClr val="accent1"/>
+          </a:effectRef>
+          <a:fontRef idx="minor">
+            <a:schemeClr val="lt1"/>
+          </a:fontRef>
+        </p:style>
+        <p:txBody>
+          <a:bodyPr wrap="square" rtlCol="0" anchor="ctr">
+            <a:noAutofit/>
+          </a:bodyPr>
+          <a:lstStyle/>
+          <a:p>
+            <a:pPr algn="ctr"/>
+            <a:endParaRPr lang="en-US" dirty="0"/>
+          </a:p>
+        </p:txBody>
+      </p:sp>
+      <p:sp>
+        <p:nvSpPr>
+          <p:cNvPr id="21" name="Isosceles Triangle 20">
+            <a:extLst>
+              <a:ext uri="{FF2B5EF4-FFF2-40B4-BE49-F238E27FC236}">
+                <a16:creationId xmlns:a16="http://schemas.microsoft.com/office/drawing/2014/main" id="{FF9F2414-84E8-453E-B1F3-389FDE8192D9}"/>
+              </a:ext>
+              <a:ext uri="{C183D7F6-B498-43B3-948B-1728B52AA6E4}">
+                <adec:decorative xmlns:adec="http://schemas.microsoft.com/office/drawing/2017/decorative" val="1"/>
+              </a:ext>
+            </a:extLst>
+          </p:cNvPr>
+          <p:cNvSpPr>
+            <a:spLocks noGrp="1" noRot="1" noChangeAspect="1" noMove="1" noResize="1" noEditPoints="1" noAdjustHandles="1" noChangeArrowheads="1" noChangeShapeType="1" noTextEdit="1"/>
+          </p:cNvSpPr>
+          <p:nvPr>
+            <p:extLst>
+              <p:ext uri="{386F3935-93C4-4BCD-93E2-E3B085C9AB24}">
+                <p16:designElem xmlns:p16="http://schemas.microsoft.com/office/powerpoint/2015/main" val="1"/>
+              </p:ext>
+            </p:extLst>
+          </p:nvPr>
+        </p:nvSpPr>
+        <p:spPr>
+          <a:xfrm flipH="1">
+            <a:off x="7976344" y="6115501"/>
+            <a:ext cx="1494513" cy="742499"/>
+          </a:xfrm>
+          <a:prstGeom prst="triangle">
+            <a:avLst/>
+          </a:prstGeom>
+          <a:solidFill>
+            <a:schemeClr val="accent1">
+              <a:alpha val="30000"/>
+            </a:schemeClr>
+          </a:solidFill>
+          <a:ln>
+            <a:noFill/>
+          </a:ln>
+        </p:spPr>
+        <p:style>
+          <a:lnRef idx="2">
+            <a:schemeClr val="accent1">
+              <a:shade val="50000"/>
+            </a:schemeClr>
+          </a:lnRef>
+          <a:fillRef idx="1">
+            <a:schemeClr val="accent1"/>
+          </a:fillRef>
+          <a:effectRef idx="0">
+            <a:schemeClr val="accent1"/>
+          </a:effectRef>
+          <a:fontRef idx="minor">
+            <a:schemeClr val="lt1"/>
+          </a:fontRef>
+        </p:style>
+        <p:txBody>
+          <a:bodyPr rtlCol="0" anchor="ctr"/>
+          <a:lstStyle/>
+          <a:p>
+            <a:pPr algn="ctr"/>
+            <a:endParaRPr lang="en-US"/>
+          </a:p>
+        </p:txBody>
+      </p:sp>
       <p:pic>
         <p:nvPicPr>
-          <p:cNvPr id="3" name="Image 2">
-            <a:extLst>
-              <a:ext uri="{FF2B5EF4-FFF2-40B4-BE49-F238E27FC236}">
-                <a16:creationId xmlns:a16="http://schemas.microsoft.com/office/drawing/2014/main" id="{29907C9E-1CF9-66CE-3F4B-6C5CB85465AD}"/>
+          <p:cNvPr id="6" name="Image 5">
+            <a:extLst>
+              <a:ext uri="{FF2B5EF4-FFF2-40B4-BE49-F238E27FC236}">
+                <a16:creationId xmlns:a16="http://schemas.microsoft.com/office/drawing/2014/main" id="{199EE396-EEC7-6C72-C04A-C2B8099802D4}"/>
               </a:ext>
             </a:extLst>
           </p:cNvPr>
@@ -3942,21 +4550,89 @@
           </a:stretch>
         </p:blipFill>
         <p:spPr>
-          <a:xfrm rot="5400000">
-            <a:off x="171934" y="136380"/>
-            <a:ext cx="5023159" cy="5045940"/>
+          <a:xfrm rot="16200000">
+            <a:off x="3308832" y="940926"/>
+            <a:ext cx="5247104" cy="5300106"/>
           </a:xfrm>
           <a:prstGeom prst="rect">
             <a:avLst/>
           </a:prstGeom>
+          <a:ln>
+            <a:noFill/>
+          </a:ln>
         </p:spPr>
       </p:pic>
       <p:sp>
         <p:nvSpPr>
-          <p:cNvPr id="4" name="ZoneTexte 3">
-            <a:extLst>
-              <a:ext uri="{FF2B5EF4-FFF2-40B4-BE49-F238E27FC236}">
-                <a16:creationId xmlns:a16="http://schemas.microsoft.com/office/drawing/2014/main" id="{A3B6F21F-E13E-6514-6266-F60F065E2CDE}"/>
+          <p:cNvPr id="23" name="Isosceles Triangle 22">
+            <a:extLst>
+              <a:ext uri="{FF2B5EF4-FFF2-40B4-BE49-F238E27FC236}">
+                <a16:creationId xmlns:a16="http://schemas.microsoft.com/office/drawing/2014/main" id="{3ECA69A1-7536-43AC-85EF-C7106179F5ED}"/>
+              </a:ext>
+              <a:ext uri="{C183D7F6-B498-43B3-948B-1728B52AA6E4}">
+                <adec:decorative xmlns:adec="http://schemas.microsoft.com/office/drawing/2017/decorative" val="1"/>
+              </a:ext>
+            </a:extLst>
+          </p:cNvPr>
+          <p:cNvSpPr>
+            <a:spLocks noGrp="1" noRot="1" noChangeAspect="1" noMove="1" noResize="1" noEditPoints="1" noAdjustHandles="1" noChangeArrowheads="1" noChangeShapeType="1" noTextEdit="1"/>
+          </p:cNvSpPr>
+          <p:nvPr>
+            <p:extLst>
+              <p:ext uri="{386F3935-93C4-4BCD-93E2-E3B085C9AB24}">
+                <p16:designElem xmlns:p16="http://schemas.microsoft.com/office/powerpoint/2015/main" val="1"/>
+              </p:ext>
+            </p:extLst>
+          </p:nvPr>
+        </p:nvSpPr>
+        <p:spPr>
+          <a:xfrm flipH="1">
+            <a:off x="7604080" y="6453143"/>
+            <a:ext cx="814903" cy="404857"/>
+          </a:xfrm>
+          <a:prstGeom prst="triangle">
+            <a:avLst/>
+          </a:prstGeom>
+          <a:solidFill>
+            <a:schemeClr val="accent1">
+              <a:alpha val="30000"/>
+            </a:schemeClr>
+          </a:solidFill>
+          <a:ln>
+            <a:noFill/>
+          </a:ln>
+        </p:spPr>
+        <p:style>
+          <a:lnRef idx="2">
+            <a:schemeClr val="accent1">
+              <a:shade val="50000"/>
+            </a:schemeClr>
+          </a:lnRef>
+          <a:fillRef idx="1">
+            <a:schemeClr val="accent1"/>
+          </a:fillRef>
+          <a:effectRef idx="0">
+            <a:schemeClr val="accent1"/>
+          </a:effectRef>
+          <a:fontRef idx="minor">
+            <a:schemeClr val="lt1"/>
+          </a:fontRef>
+        </p:style>
+        <p:txBody>
+          <a:bodyPr rtlCol="0" anchor="ctr"/>
+          <a:lstStyle/>
+          <a:p>
+            <a:pPr algn="ctr"/>
+            <a:endParaRPr lang="en-US"/>
+          </a:p>
+        </p:txBody>
+      </p:sp>
+      <p:sp>
+        <p:nvSpPr>
+          <p:cNvPr id="7" name="ZoneTexte 6">
+            <a:extLst>
+              <a:ext uri="{FF2B5EF4-FFF2-40B4-BE49-F238E27FC236}">
+                <a16:creationId xmlns:a16="http://schemas.microsoft.com/office/drawing/2014/main" id="{72B66EC2-8C77-5EFD-E41C-479771A95BA0}"/>
               </a:ext>
             </a:extLst>
           </p:cNvPr>
@@ -3965,8 +4641,8 @@
         </p:nvSpPr>
         <p:spPr>
           <a:xfrm>
-            <a:off x="160545" y="5316871"/>
-            <a:ext cx="3559629" cy="369332"/>
+            <a:off x="68308" y="2266015"/>
+            <a:ext cx="3204723" cy="646331"/>
           </a:xfrm>
           <a:prstGeom prst="rect">
             <a:avLst/>
@@ -3980,137 +4656,102 @@
           <a:lstStyle/>
           <a:p>
             <a:r>
-              <a:rPr lang="fr-FR" b="1" dirty="0">
-                <a:solidFill>
-                  <a:srgbClr val="FF0000"/>
-                </a:solidFill>
-              </a:rPr>
-              <a:t>Diamètre 6,5 cm (et non 6,5 mm)</a:t>
-            </a:r>
-          </a:p>
-        </p:txBody>
-      </p:sp>
-      <p:sp>
-        <p:nvSpPr>
-          <p:cNvPr id="6" name="ZoneTexte 5">
-            <a:extLst>
-              <a:ext uri="{FF2B5EF4-FFF2-40B4-BE49-F238E27FC236}">
-                <a16:creationId xmlns:a16="http://schemas.microsoft.com/office/drawing/2014/main" id="{8A4A49E4-F392-2AFE-2E29-ACB1C5E15C11}"/>
-              </a:ext>
-            </a:extLst>
-          </p:cNvPr>
-          <p:cNvSpPr txBox="1"/>
+              <a:rPr lang="fr-FR" dirty="0"/>
+              <a:t>2 trous 4mm en bas</a:t>
+            </a:r>
+          </a:p>
+          <a:p>
+            <a:r>
+              <a:rPr lang="fr-FR" dirty="0"/>
+              <a:t>pour fixer la boîte électronique</a:t>
+            </a:r>
+          </a:p>
+        </p:txBody>
+      </p:sp>
+      <p:cxnSp>
+        <p:nvCxnSpPr>
+          <p:cNvPr id="9" name="Connecteur droit avec flèche 8">
+            <a:extLst>
+              <a:ext uri="{FF2B5EF4-FFF2-40B4-BE49-F238E27FC236}">
+                <a16:creationId xmlns:a16="http://schemas.microsoft.com/office/drawing/2014/main" id="{6705F289-874C-E066-73B9-E4FE726B9CD5}"/>
+              </a:ext>
+            </a:extLst>
+          </p:cNvPr>
+          <p:cNvCxnSpPr/>
           <p:nvPr/>
-        </p:nvSpPr>
+        </p:nvCxnSpPr>
         <p:spPr>
           <a:xfrm>
-            <a:off x="160545" y="5920806"/>
-            <a:ext cx="6112827" cy="646331"/>
-          </a:xfrm>
-          <a:prstGeom prst="rect">
+            <a:off x="1520890" y="3004457"/>
+            <a:ext cx="2584579" cy="1819470"/>
+          </a:xfrm>
+          <a:prstGeom prst="straightConnector1">
             <a:avLst/>
           </a:prstGeom>
-          <a:noFill/>
-        </p:spPr>
-        <p:txBody>
-          <a:bodyPr wrap="none" rtlCol="0">
-            <a:spAutoFit/>
-          </a:bodyPr>
-          <a:lstStyle/>
-          <a:p>
-            <a:pPr marL="285750" indent="-285750">
-              <a:buFont typeface="Arial" panose="020B0604020202020204" pitchFamily="34" charset="0"/>
-              <a:buChar char="•"/>
-            </a:pPr>
-            <a:r>
-              <a:rPr lang="fr-FR" dirty="0"/>
-              <a:t>Usiner (à la </a:t>
-            </a:r>
-            <a:r>
-              <a:rPr lang="fr-FR" dirty="0" err="1"/>
-              <a:t>Dremel</a:t>
-            </a:r>
-            <a:r>
-              <a:rPr lang="fr-FR" dirty="0"/>
-              <a:t>) une fente pour les deux cosses</a:t>
-            </a:r>
-          </a:p>
-          <a:p>
-            <a:pPr marL="285750" indent="-285750">
-              <a:buFont typeface="Arial" panose="020B0604020202020204" pitchFamily="34" charset="0"/>
-              <a:buChar char="•"/>
-            </a:pPr>
-            <a:r>
-              <a:rPr lang="fr-FR" dirty="0"/>
-              <a:t>Percer avec un forêt de 16mm un trou pour l'arrivée d'eau</a:t>
-            </a:r>
-          </a:p>
-        </p:txBody>
-      </p:sp>
-      <p:pic>
-        <p:nvPicPr>
-          <p:cNvPr id="8" name="Image 7">
-            <a:extLst>
-              <a:ext uri="{FF2B5EF4-FFF2-40B4-BE49-F238E27FC236}">
-                <a16:creationId xmlns:a16="http://schemas.microsoft.com/office/drawing/2014/main" id="{7F15F4DE-4B59-289A-C65A-38D16BC917D7}"/>
-              </a:ext>
-            </a:extLst>
-          </p:cNvPr>
-          <p:cNvPicPr>
-            <a:picLocks noChangeAspect="1"/>
-          </p:cNvPicPr>
+          <a:ln>
+            <a:tailEnd type="triangle"/>
+          </a:ln>
+        </p:spPr>
+        <p:style>
+          <a:lnRef idx="2">
+            <a:schemeClr val="dk1"/>
+          </a:lnRef>
+          <a:fillRef idx="0">
+            <a:schemeClr val="dk1"/>
+          </a:fillRef>
+          <a:effectRef idx="1">
+            <a:schemeClr val="dk1"/>
+          </a:effectRef>
+          <a:fontRef idx="minor">
+            <a:schemeClr val="tx1"/>
+          </a:fontRef>
+        </p:style>
+      </p:cxnSp>
+      <p:cxnSp>
+        <p:nvCxnSpPr>
+          <p:cNvPr id="10" name="Connecteur droit avec flèche 9">
+            <a:extLst>
+              <a:ext uri="{FF2B5EF4-FFF2-40B4-BE49-F238E27FC236}">
+                <a16:creationId xmlns:a16="http://schemas.microsoft.com/office/drawing/2014/main" id="{A0F1B9F7-90E7-2ABE-DE12-8849BA625541}"/>
+              </a:ext>
+            </a:extLst>
+          </p:cNvPr>
+          <p:cNvCxnSpPr>
+            <a:cxnSpLocks/>
+          </p:cNvCxnSpPr>
           <p:nvPr/>
-        </p:nvPicPr>
-        <p:blipFill>
-          <a:blip r:embed="rId3"/>
-          <a:stretch>
-            <a:fillRect/>
-          </a:stretch>
-        </p:blipFill>
+        </p:nvCxnSpPr>
         <p:spPr>
           <a:xfrm>
-            <a:off x="7703975" y="791337"/>
-            <a:ext cx="2381995" cy="2473340"/>
-          </a:xfrm>
-          <a:prstGeom prst="rect">
+            <a:off x="2109457" y="2912346"/>
+            <a:ext cx="5278342" cy="1822616"/>
+          </a:xfrm>
+          <a:prstGeom prst="straightConnector1">
             <a:avLst/>
           </a:prstGeom>
-        </p:spPr>
-      </p:pic>
-      <p:pic>
-        <p:nvPicPr>
-          <p:cNvPr id="10" name="Image 9">
-            <a:extLst>
-              <a:ext uri="{FF2B5EF4-FFF2-40B4-BE49-F238E27FC236}">
-                <a16:creationId xmlns:a16="http://schemas.microsoft.com/office/drawing/2014/main" id="{0B970471-1DDE-9537-0346-7836F4B3DDED}"/>
-              </a:ext>
-            </a:extLst>
-          </p:cNvPr>
-          <p:cNvPicPr>
-            <a:picLocks noChangeAspect="1"/>
-          </p:cNvPicPr>
-          <p:nvPr/>
-        </p:nvPicPr>
-        <p:blipFill>
-          <a:blip r:embed="rId4"/>
-          <a:stretch>
-            <a:fillRect/>
-          </a:stretch>
-        </p:blipFill>
-        <p:spPr>
-          <a:xfrm>
-            <a:off x="7703975" y="3552268"/>
-            <a:ext cx="2381995" cy="2368538"/>
-          </a:xfrm>
-          <a:prstGeom prst="rect">
-            <a:avLst/>
-          </a:prstGeom>
-        </p:spPr>
-      </p:pic>
+          <a:ln>
+            <a:tailEnd type="triangle"/>
+          </a:ln>
+        </p:spPr>
+        <p:style>
+          <a:lnRef idx="2">
+            <a:schemeClr val="dk1"/>
+          </a:lnRef>
+          <a:fillRef idx="0">
+            <a:schemeClr val="dk1"/>
+          </a:fillRef>
+          <a:effectRef idx="1">
+            <a:schemeClr val="dk1"/>
+          </a:effectRef>
+          <a:fontRef idx="minor">
+            <a:schemeClr val="tx1"/>
+          </a:fontRef>
+        </p:style>
+      </p:cxnSp>
     </p:spTree>
     <p:extLst>
       <p:ext uri="{BB962C8B-B14F-4D97-AF65-F5344CB8AC3E}">
-        <p14:creationId xmlns:p14="http://schemas.microsoft.com/office/powerpoint/2010/main" val="2849872018"/>
+        <p14:creationId xmlns:p14="http://schemas.microsoft.com/office/powerpoint/2010/main" val="2887978948"/>
       </p:ext>
     </p:extLst>
   </p:cSld>
@@ -4401,6 +5042,222 @@
 </file>
 
 <file path=ppt/slides/slide5.xml><?xml version="1.0" encoding="utf-8"?>
+<p:sld xmlns:a="http://schemas.openxmlformats.org/drawingml/2006/main" xmlns:r="http://schemas.openxmlformats.org/officeDocument/2006/relationships" xmlns:p="http://schemas.openxmlformats.org/presentationml/2006/main">
+  <p:cSld>
+    <p:spTree>
+      <p:nvGrpSpPr>
+        <p:cNvPr id="1" name=""/>
+        <p:cNvGrpSpPr/>
+        <p:nvPr/>
+      </p:nvGrpSpPr>
+      <p:grpSpPr>
+        <a:xfrm>
+          <a:off x="0" y="0"/>
+          <a:ext cx="0" cy="0"/>
+          <a:chOff x="0" y="0"/>
+          <a:chExt cx="0" cy="0"/>
+        </a:xfrm>
+      </p:grpSpPr>
+      <p:pic>
+        <p:nvPicPr>
+          <p:cNvPr id="3" name="Image 2">
+            <a:extLst>
+              <a:ext uri="{FF2B5EF4-FFF2-40B4-BE49-F238E27FC236}">
+                <a16:creationId xmlns:a16="http://schemas.microsoft.com/office/drawing/2014/main" id="{29907C9E-1CF9-66CE-3F4B-6C5CB85465AD}"/>
+              </a:ext>
+            </a:extLst>
+          </p:cNvPr>
+          <p:cNvPicPr>
+            <a:picLocks noChangeAspect="1"/>
+          </p:cNvPicPr>
+          <p:nvPr/>
+        </p:nvPicPr>
+        <p:blipFill>
+          <a:blip r:embed="rId2"/>
+          <a:stretch>
+            <a:fillRect/>
+          </a:stretch>
+        </p:blipFill>
+        <p:spPr>
+          <a:xfrm rot="5400000">
+            <a:off x="171934" y="136380"/>
+            <a:ext cx="5023159" cy="5045940"/>
+          </a:xfrm>
+          <a:prstGeom prst="rect">
+            <a:avLst/>
+          </a:prstGeom>
+        </p:spPr>
+      </p:pic>
+      <p:sp>
+        <p:nvSpPr>
+          <p:cNvPr id="4" name="ZoneTexte 3">
+            <a:extLst>
+              <a:ext uri="{FF2B5EF4-FFF2-40B4-BE49-F238E27FC236}">
+                <a16:creationId xmlns:a16="http://schemas.microsoft.com/office/drawing/2014/main" id="{A3B6F21F-E13E-6514-6266-F60F065E2CDE}"/>
+              </a:ext>
+            </a:extLst>
+          </p:cNvPr>
+          <p:cNvSpPr txBox="1"/>
+          <p:nvPr/>
+        </p:nvSpPr>
+        <p:spPr>
+          <a:xfrm>
+            <a:off x="160545" y="5316871"/>
+            <a:ext cx="4096763" cy="369332"/>
+          </a:xfrm>
+          <a:prstGeom prst="rect">
+            <a:avLst/>
+          </a:prstGeom>
+          <a:noFill/>
+        </p:spPr>
+        <p:txBody>
+          <a:bodyPr wrap="none" rtlCol="0">
+            <a:spAutoFit/>
+          </a:bodyPr>
+          <a:lstStyle/>
+          <a:p>
+            <a:r>
+              <a:rPr lang="fr-FR" b="1" dirty="0">
+                <a:solidFill>
+                  <a:srgbClr val="FF0000"/>
+                </a:solidFill>
+              </a:rPr>
+              <a:t>Diamètre total 6,5 cm (et non 6,5 mm)</a:t>
+            </a:r>
+          </a:p>
+        </p:txBody>
+      </p:sp>
+      <p:sp>
+        <p:nvSpPr>
+          <p:cNvPr id="6" name="ZoneTexte 5">
+            <a:extLst>
+              <a:ext uri="{FF2B5EF4-FFF2-40B4-BE49-F238E27FC236}">
+                <a16:creationId xmlns:a16="http://schemas.microsoft.com/office/drawing/2014/main" id="{8A4A49E4-F392-2AFE-2E29-ACB1C5E15C11}"/>
+              </a:ext>
+            </a:extLst>
+          </p:cNvPr>
+          <p:cNvSpPr txBox="1"/>
+          <p:nvPr/>
+        </p:nvSpPr>
+        <p:spPr>
+          <a:xfrm>
+            <a:off x="160545" y="5920806"/>
+            <a:ext cx="6112827" cy="646331"/>
+          </a:xfrm>
+          <a:prstGeom prst="rect">
+            <a:avLst/>
+          </a:prstGeom>
+          <a:noFill/>
+        </p:spPr>
+        <p:txBody>
+          <a:bodyPr wrap="none" rtlCol="0">
+            <a:spAutoFit/>
+          </a:bodyPr>
+          <a:lstStyle/>
+          <a:p>
+            <a:pPr marL="285750" indent="-285750">
+              <a:buFont typeface="Arial" panose="020B0604020202020204" pitchFamily="34" charset="0"/>
+              <a:buChar char="•"/>
+            </a:pPr>
+            <a:r>
+              <a:rPr lang="fr-FR" dirty="0"/>
+              <a:t>Usiner (à la </a:t>
+            </a:r>
+            <a:r>
+              <a:rPr lang="fr-FR" dirty="0" err="1"/>
+              <a:t>Dremel</a:t>
+            </a:r>
+            <a:r>
+              <a:rPr lang="fr-FR" dirty="0"/>
+              <a:t>) une fente pour les deux cosses</a:t>
+            </a:r>
+          </a:p>
+          <a:p>
+            <a:pPr marL="285750" indent="-285750">
+              <a:buFont typeface="Arial" panose="020B0604020202020204" pitchFamily="34" charset="0"/>
+              <a:buChar char="•"/>
+            </a:pPr>
+            <a:r>
+              <a:rPr lang="fr-FR" dirty="0"/>
+              <a:t>Percer avec un forêt de 16mm un trou pour l'arrivée d'eau</a:t>
+            </a:r>
+          </a:p>
+        </p:txBody>
+      </p:sp>
+      <p:pic>
+        <p:nvPicPr>
+          <p:cNvPr id="8" name="Image 7">
+            <a:extLst>
+              <a:ext uri="{FF2B5EF4-FFF2-40B4-BE49-F238E27FC236}">
+                <a16:creationId xmlns:a16="http://schemas.microsoft.com/office/drawing/2014/main" id="{7F15F4DE-4B59-289A-C65A-38D16BC917D7}"/>
+              </a:ext>
+            </a:extLst>
+          </p:cNvPr>
+          <p:cNvPicPr>
+            <a:picLocks noChangeAspect="1"/>
+          </p:cNvPicPr>
+          <p:nvPr/>
+        </p:nvPicPr>
+        <p:blipFill>
+          <a:blip r:embed="rId3"/>
+          <a:stretch>
+            <a:fillRect/>
+          </a:stretch>
+        </p:blipFill>
+        <p:spPr>
+          <a:xfrm>
+            <a:off x="7703975" y="791337"/>
+            <a:ext cx="2381995" cy="2473340"/>
+          </a:xfrm>
+          <a:prstGeom prst="rect">
+            <a:avLst/>
+          </a:prstGeom>
+        </p:spPr>
+      </p:pic>
+      <p:pic>
+        <p:nvPicPr>
+          <p:cNvPr id="10" name="Image 9">
+            <a:extLst>
+              <a:ext uri="{FF2B5EF4-FFF2-40B4-BE49-F238E27FC236}">
+                <a16:creationId xmlns:a16="http://schemas.microsoft.com/office/drawing/2014/main" id="{0B970471-1DDE-9537-0346-7836F4B3DDED}"/>
+              </a:ext>
+            </a:extLst>
+          </p:cNvPr>
+          <p:cNvPicPr>
+            <a:picLocks noChangeAspect="1"/>
+          </p:cNvPicPr>
+          <p:nvPr/>
+        </p:nvPicPr>
+        <p:blipFill>
+          <a:blip r:embed="rId4"/>
+          <a:stretch>
+            <a:fillRect/>
+          </a:stretch>
+        </p:blipFill>
+        <p:spPr>
+          <a:xfrm>
+            <a:off x="7703975" y="3552268"/>
+            <a:ext cx="2381995" cy="2368538"/>
+          </a:xfrm>
+          <a:prstGeom prst="rect">
+            <a:avLst/>
+          </a:prstGeom>
+        </p:spPr>
+      </p:pic>
+    </p:spTree>
+    <p:extLst>
+      <p:ext uri="{BB962C8B-B14F-4D97-AF65-F5344CB8AC3E}">
+        <p14:creationId xmlns:p14="http://schemas.microsoft.com/office/powerpoint/2010/main" val="2849872018"/>
+      </p:ext>
+    </p:extLst>
+  </p:cSld>
+  <p:clrMapOvr>
+    <a:masterClrMapping/>
+  </p:clrMapOvr>
+</p:sld>
+</file>
+
+<file path=ppt/slides/slide6.xml><?xml version="1.0" encoding="utf-8"?>
 <p:sld xmlns:a="http://schemas.openxmlformats.org/drawingml/2006/main" xmlns:r="http://schemas.openxmlformats.org/officeDocument/2006/relationships" xmlns:p="http://schemas.openxmlformats.org/presentationml/2006/main">
   <p:cSld>
     <p:bg>

</xml_diff>

<commit_message>
Mise au point esclave (probleme d'instabilite car depassement de pile)
</commit_message>
<xml_diff>
--- a/jarduino2/jard_485_slave/fabrication/modele_2024/howto.pptx
+++ b/jarduino2/jard_485_slave/fabrication/modele_2024/howto.pptx
@@ -11,6 +11,7 @@
     <p:sldId id="259" r:id="rId5"/>
     <p:sldId id="258" r:id="rId6"/>
     <p:sldId id="260" r:id="rId7"/>
+    <p:sldId id="263" r:id="rId8"/>
   </p:sldIdLst>
   <p:sldSz cx="12192000" cy="6858000"/>
   <p:notesSz cx="6797675" cy="9926638"/>
@@ -264,7 +265,7 @@
           <a:p>
             <a:fld id="{7F33ED73-A2C0-4FF3-844A-2E17AC728519}" type="datetimeFigureOut">
               <a:rPr lang="fr-FR" smtClean="0"/>
-              <a:t>01/04/2024</a:t>
+              <a:t>02/06/2024</a:t>
             </a:fld>
             <a:endParaRPr lang="fr-FR"/>
           </a:p>
@@ -462,7 +463,7 @@
           <a:p>
             <a:fld id="{7F33ED73-A2C0-4FF3-844A-2E17AC728519}" type="datetimeFigureOut">
               <a:rPr lang="fr-FR" smtClean="0"/>
-              <a:t>01/04/2024</a:t>
+              <a:t>02/06/2024</a:t>
             </a:fld>
             <a:endParaRPr lang="fr-FR"/>
           </a:p>
@@ -670,7 +671,7 @@
           <a:p>
             <a:fld id="{7F33ED73-A2C0-4FF3-844A-2E17AC728519}" type="datetimeFigureOut">
               <a:rPr lang="fr-FR" smtClean="0"/>
-              <a:t>01/04/2024</a:t>
+              <a:t>02/06/2024</a:t>
             </a:fld>
             <a:endParaRPr lang="fr-FR"/>
           </a:p>
@@ -868,7 +869,7 @@
           <a:p>
             <a:fld id="{7F33ED73-A2C0-4FF3-844A-2E17AC728519}" type="datetimeFigureOut">
               <a:rPr lang="fr-FR" smtClean="0"/>
-              <a:t>01/04/2024</a:t>
+              <a:t>02/06/2024</a:t>
             </a:fld>
             <a:endParaRPr lang="fr-FR"/>
           </a:p>
@@ -1143,7 +1144,7 @@
           <a:p>
             <a:fld id="{7F33ED73-A2C0-4FF3-844A-2E17AC728519}" type="datetimeFigureOut">
               <a:rPr lang="fr-FR" smtClean="0"/>
-              <a:t>01/04/2024</a:t>
+              <a:t>02/06/2024</a:t>
             </a:fld>
             <a:endParaRPr lang="fr-FR"/>
           </a:p>
@@ -1408,7 +1409,7 @@
           <a:p>
             <a:fld id="{7F33ED73-A2C0-4FF3-844A-2E17AC728519}" type="datetimeFigureOut">
               <a:rPr lang="fr-FR" smtClean="0"/>
-              <a:t>01/04/2024</a:t>
+              <a:t>02/06/2024</a:t>
             </a:fld>
             <a:endParaRPr lang="fr-FR"/>
           </a:p>
@@ -1820,7 +1821,7 @@
           <a:p>
             <a:fld id="{7F33ED73-A2C0-4FF3-844A-2E17AC728519}" type="datetimeFigureOut">
               <a:rPr lang="fr-FR" smtClean="0"/>
-              <a:t>01/04/2024</a:t>
+              <a:t>02/06/2024</a:t>
             </a:fld>
             <a:endParaRPr lang="fr-FR"/>
           </a:p>
@@ -1961,7 +1962,7 @@
           <a:p>
             <a:fld id="{7F33ED73-A2C0-4FF3-844A-2E17AC728519}" type="datetimeFigureOut">
               <a:rPr lang="fr-FR" smtClean="0"/>
-              <a:t>01/04/2024</a:t>
+              <a:t>02/06/2024</a:t>
             </a:fld>
             <a:endParaRPr lang="fr-FR"/>
           </a:p>
@@ -2074,7 +2075,7 @@
           <a:p>
             <a:fld id="{7F33ED73-A2C0-4FF3-844A-2E17AC728519}" type="datetimeFigureOut">
               <a:rPr lang="fr-FR" smtClean="0"/>
-              <a:t>01/04/2024</a:t>
+              <a:t>02/06/2024</a:t>
             </a:fld>
             <a:endParaRPr lang="fr-FR"/>
           </a:p>
@@ -2385,7 +2386,7 @@
           <a:p>
             <a:fld id="{7F33ED73-A2C0-4FF3-844A-2E17AC728519}" type="datetimeFigureOut">
               <a:rPr lang="fr-FR" smtClean="0"/>
-              <a:t>01/04/2024</a:t>
+              <a:t>02/06/2024</a:t>
             </a:fld>
             <a:endParaRPr lang="fr-FR"/>
           </a:p>
@@ -2673,7 +2674,7 @@
           <a:p>
             <a:fld id="{7F33ED73-A2C0-4FF3-844A-2E17AC728519}" type="datetimeFigureOut">
               <a:rPr lang="fr-FR" smtClean="0"/>
-              <a:t>01/04/2024</a:t>
+              <a:t>02/06/2024</a:t>
             </a:fld>
             <a:endParaRPr lang="fr-FR"/>
           </a:p>
@@ -2914,7 +2915,7 @@
           <a:p>
             <a:fld id="{7F33ED73-A2C0-4FF3-844A-2E17AC728519}" type="datetimeFigureOut">
               <a:rPr lang="fr-FR" smtClean="0"/>
-              <a:t>01/04/2024</a:t>
+              <a:t>02/06/2024</a:t>
             </a:fld>
             <a:endParaRPr lang="fr-FR"/>
           </a:p>
@@ -5533,6 +5534,234 @@
     <p:extLst>
       <p:ext uri="{BB962C8B-B14F-4D97-AF65-F5344CB8AC3E}">
         <p14:creationId xmlns:p14="http://schemas.microsoft.com/office/powerpoint/2010/main" val="3546534099"/>
+      </p:ext>
+    </p:extLst>
+  </p:cSld>
+  <p:clrMapOvr>
+    <a:masterClrMapping/>
+  </p:clrMapOvr>
+</p:sld>
+</file>
+
+<file path=ppt/slides/slide7.xml><?xml version="1.0" encoding="utf-8"?>
+<p:sld xmlns:a="http://schemas.openxmlformats.org/drawingml/2006/main" xmlns:r="http://schemas.openxmlformats.org/officeDocument/2006/relationships" xmlns:p="http://schemas.openxmlformats.org/presentationml/2006/main">
+  <p:cSld>
+    <p:spTree>
+      <p:nvGrpSpPr>
+        <p:cNvPr id="1" name=""/>
+        <p:cNvGrpSpPr/>
+        <p:nvPr/>
+      </p:nvGrpSpPr>
+      <p:grpSpPr>
+        <a:xfrm>
+          <a:off x="0" y="0"/>
+          <a:ext cx="0" cy="0"/>
+          <a:chOff x="0" y="0"/>
+          <a:chExt cx="0" cy="0"/>
+        </a:xfrm>
+      </p:grpSpPr>
+      <p:sp>
+        <p:nvSpPr>
+          <p:cNvPr id="4" name="ZoneTexte 3">
+            <a:extLst>
+              <a:ext uri="{FF2B5EF4-FFF2-40B4-BE49-F238E27FC236}">
+                <a16:creationId xmlns:a16="http://schemas.microsoft.com/office/drawing/2014/main" id="{95F1AC9F-61AA-E768-6469-79922E18AEAF}"/>
+              </a:ext>
+            </a:extLst>
+          </p:cNvPr>
+          <p:cNvSpPr txBox="1"/>
+          <p:nvPr/>
+        </p:nvSpPr>
+        <p:spPr>
+          <a:xfrm>
+            <a:off x="289711" y="190122"/>
+            <a:ext cx="2962671" cy="646331"/>
+          </a:xfrm>
+          <a:prstGeom prst="rect">
+            <a:avLst/>
+          </a:prstGeom>
+          <a:noFill/>
+        </p:spPr>
+        <p:txBody>
+          <a:bodyPr wrap="none" rtlCol="0">
+            <a:spAutoFit/>
+          </a:bodyPr>
+          <a:lstStyle/>
+          <a:p>
+            <a:r>
+              <a:rPr lang="fr-FR" sz="3600" dirty="0"/>
+              <a:t>Cable Réseau</a:t>
+            </a:r>
+          </a:p>
+        </p:txBody>
+      </p:sp>
+      <p:pic>
+        <p:nvPicPr>
+          <p:cNvPr id="6" name="Image 5">
+            <a:extLst>
+              <a:ext uri="{FF2B5EF4-FFF2-40B4-BE49-F238E27FC236}">
+                <a16:creationId xmlns:a16="http://schemas.microsoft.com/office/drawing/2014/main" id="{D774B097-21FD-70E1-206E-AE68FB5FC6C7}"/>
+              </a:ext>
+            </a:extLst>
+          </p:cNvPr>
+          <p:cNvPicPr>
+            <a:picLocks noChangeAspect="1"/>
+          </p:cNvPicPr>
+          <p:nvPr/>
+        </p:nvPicPr>
+        <p:blipFill>
+          <a:blip r:embed="rId2"/>
+          <a:stretch>
+            <a:fillRect/>
+          </a:stretch>
+        </p:blipFill>
+        <p:spPr>
+          <a:xfrm>
+            <a:off x="2510621" y="1507322"/>
+            <a:ext cx="3678216" cy="1188172"/>
+          </a:xfrm>
+          <a:prstGeom prst="rect">
+            <a:avLst/>
+          </a:prstGeom>
+        </p:spPr>
+      </p:pic>
+      <p:sp>
+        <p:nvSpPr>
+          <p:cNvPr id="7" name="ZoneTexte 6">
+            <a:extLst>
+              <a:ext uri="{FF2B5EF4-FFF2-40B4-BE49-F238E27FC236}">
+                <a16:creationId xmlns:a16="http://schemas.microsoft.com/office/drawing/2014/main" id="{4F47ADDC-2780-8D7A-A764-D5B4E116485C}"/>
+              </a:ext>
+            </a:extLst>
+          </p:cNvPr>
+          <p:cNvSpPr txBox="1"/>
+          <p:nvPr/>
+        </p:nvSpPr>
+        <p:spPr>
+          <a:xfrm>
+            <a:off x="620850" y="1495165"/>
+            <a:ext cx="1797223" cy="1200329"/>
+          </a:xfrm>
+          <a:prstGeom prst="rect">
+            <a:avLst/>
+          </a:prstGeom>
+          <a:noFill/>
+        </p:spPr>
+        <p:txBody>
+          <a:bodyPr wrap="none" rtlCol="0">
+            <a:spAutoFit/>
+          </a:bodyPr>
+          <a:lstStyle/>
+          <a:p>
+            <a:r>
+              <a:rPr lang="fr-FR" dirty="0"/>
+              <a:t>1 – Rouge : +12V</a:t>
+            </a:r>
+          </a:p>
+          <a:p>
+            <a:r>
+              <a:rPr lang="fr-FR" dirty="0"/>
+              <a:t>2 – Noir : Masse </a:t>
+            </a:r>
+          </a:p>
+          <a:p>
+            <a:r>
+              <a:rPr lang="fr-FR" dirty="0"/>
+              <a:t>3 – Bleu : Bus A</a:t>
+            </a:r>
+          </a:p>
+          <a:p>
+            <a:r>
+              <a:rPr lang="fr-FR" dirty="0"/>
+              <a:t>4 – Vert : Bus B</a:t>
+            </a:r>
+          </a:p>
+        </p:txBody>
+      </p:sp>
+      <p:pic>
+        <p:nvPicPr>
+          <p:cNvPr id="9" name="Image 8">
+            <a:extLst>
+              <a:ext uri="{FF2B5EF4-FFF2-40B4-BE49-F238E27FC236}">
+                <a16:creationId xmlns:a16="http://schemas.microsoft.com/office/drawing/2014/main" id="{0436F4BE-882B-989B-7D9B-58A6F3613AE0}"/>
+              </a:ext>
+            </a:extLst>
+          </p:cNvPr>
+          <p:cNvPicPr>
+            <a:picLocks noChangeAspect="1"/>
+          </p:cNvPicPr>
+          <p:nvPr/>
+        </p:nvPicPr>
+        <p:blipFill>
+          <a:blip r:embed="rId3"/>
+          <a:stretch>
+            <a:fillRect/>
+          </a:stretch>
+        </p:blipFill>
+        <p:spPr>
+          <a:xfrm>
+            <a:off x="6383116" y="1416422"/>
+            <a:ext cx="1381318" cy="1400370"/>
+          </a:xfrm>
+          <a:prstGeom prst="rect">
+            <a:avLst/>
+          </a:prstGeom>
+        </p:spPr>
+      </p:pic>
+      <p:sp>
+        <p:nvSpPr>
+          <p:cNvPr id="10" name="ZoneTexte 9">
+            <a:extLst>
+              <a:ext uri="{FF2B5EF4-FFF2-40B4-BE49-F238E27FC236}">
+                <a16:creationId xmlns:a16="http://schemas.microsoft.com/office/drawing/2014/main" id="{ED5500D8-B56C-5866-4052-AB5CC12FB341}"/>
+              </a:ext>
+            </a:extLst>
+          </p:cNvPr>
+          <p:cNvSpPr txBox="1"/>
+          <p:nvPr/>
+        </p:nvSpPr>
+        <p:spPr>
+          <a:xfrm>
+            <a:off x="7969202" y="1483008"/>
+            <a:ext cx="3601948" cy="1200329"/>
+          </a:xfrm>
+          <a:prstGeom prst="rect">
+            <a:avLst/>
+          </a:prstGeom>
+          <a:noFill/>
+        </p:spPr>
+        <p:txBody>
+          <a:bodyPr wrap="none" rtlCol="0">
+            <a:spAutoFit/>
+          </a:bodyPr>
+          <a:lstStyle/>
+          <a:p>
+            <a:r>
+              <a:rPr lang="fr-FR" dirty="0"/>
+              <a:t>Certains embouts Ali express</a:t>
+            </a:r>
+          </a:p>
+          <a:p>
+            <a:r>
+              <a:rPr lang="fr-FR" dirty="0"/>
+              <a:t>ne respectent pas le code couleur.</a:t>
+            </a:r>
+          </a:p>
+          <a:p>
+            <a:endParaRPr lang="fr-FR" dirty="0"/>
+          </a:p>
+          <a:p>
+            <a:r>
+              <a:rPr lang="fr-FR" dirty="0"/>
+              <a:t>Se baser sur le modèle ci-contre.</a:t>
+            </a:r>
+          </a:p>
+        </p:txBody>
+      </p:sp>
+    </p:spTree>
+    <p:extLst>
+      <p:ext uri="{BB962C8B-B14F-4D97-AF65-F5344CB8AC3E}">
+        <p14:creationId xmlns:p14="http://schemas.microsoft.com/office/powerpoint/2010/main" val="3335169950"/>
       </p:ext>
     </p:extLst>
   </p:cSld>

</xml_diff>